<commit_message>
adding presentation slide deck
</commit_message>
<xml_diff>
--- a/GRTC Project.pptx
+++ b/GRTC Project.pptx
@@ -12,9 +12,9 @@
     <p:sldId id="1343" r:id="rId7"/>
     <p:sldId id="1349" r:id="rId8"/>
     <p:sldId id="1350" r:id="rId9"/>
-    <p:sldId id="1353" r:id="rId10"/>
-    <p:sldId id="1352" r:id="rId11"/>
-    <p:sldId id="1351" r:id="rId12"/>
+    <p:sldId id="1351" r:id="rId10"/>
+    <p:sldId id="1353" r:id="rId11"/>
+    <p:sldId id="1352" r:id="rId12"/>
     <p:sldId id="1225" r:id="rId13"/>
     <p:sldId id="1226" r:id="rId14"/>
   </p:sldIdLst>
@@ -4202,7 +4202,7 @@
         </p:nvSpPr>
         <p:spPr>
           <a:xfrm>
-            <a:off x="1491615" y="1748790"/>
+            <a:off x="2263972" y="1484739"/>
             <a:ext cx="6160770" cy="4566702"/>
           </a:xfrm>
         </p:spPr>
@@ -4211,36 +4211,36 @@
           <a:lstStyle/>
           <a:p>
             <a:r>
-              <a:rPr lang="en-US" sz="1800" dirty="0"/>
+              <a:rPr lang="en-US" sz="2800" dirty="0"/>
               <a:t>Project Overview</a:t>
             </a:r>
           </a:p>
           <a:p>
             <a:r>
-              <a:rPr lang="en-US" sz="1800" dirty="0"/>
+              <a:rPr lang="en-US" sz="2800" dirty="0"/>
               <a:t>Approach</a:t>
             </a:r>
           </a:p>
           <a:p>
             <a:r>
-              <a:rPr lang="en-US" sz="1800" dirty="0"/>
+              <a:rPr lang="en-US" sz="2800" dirty="0"/>
               <a:t>Tools</a:t>
             </a:r>
           </a:p>
           <a:p>
             <a:r>
-              <a:rPr lang="en-US" sz="1800" dirty="0"/>
+              <a:rPr lang="en-US" sz="2800" dirty="0"/>
               <a:t>Analysis</a:t>
             </a:r>
           </a:p>
           <a:p>
             <a:r>
-              <a:rPr lang="en-US" sz="1800" dirty="0"/>
+              <a:rPr lang="en-US" sz="2800" dirty="0"/>
               <a:t>Conclusions</a:t>
             </a:r>
           </a:p>
           <a:p>
-            <a:endParaRPr lang="en-US" sz="1800" dirty="0"/>
+            <a:endParaRPr lang="en-US" sz="2800" dirty="0"/>
           </a:p>
         </p:txBody>
       </p:sp>
@@ -4497,7 +4497,7 @@
         </p:nvSpPr>
         <p:spPr bwMode="auto">
           <a:xfrm>
-            <a:off x="1102994" y="1484739"/>
+            <a:off x="1060132" y="1307185"/>
             <a:ext cx="7023735" cy="4566702"/>
           </a:xfrm>
           <a:prstGeom prst="rect">
@@ -4675,17 +4675,22 @@
             </a:r>
           </a:p>
           <a:p>
+            <a:pPr>
+              <a:spcBef>
+                <a:spcPts val="600"/>
+              </a:spcBef>
+            </a:pPr>
             <a:r>
               <a:rPr lang="en-US" sz="1800" kern="0" dirty="0"/>
-              <a:t>Brain-stormed ideas – looked into transportation </a:t>
-            </a:r>
-            <a:r>
-              <a:rPr lang="en-US" sz="1800" kern="0" dirty="0" err="1"/>
-              <a:t>senarios</a:t>
-            </a:r>
-            <a:endParaRPr lang="en-US" sz="1800" kern="0" dirty="0"/>
-          </a:p>
-          <a:p>
+              <a:t>Brain-stormed ideas – looked into transportation scenarios</a:t>
+            </a:r>
+          </a:p>
+          <a:p>
+            <a:pPr>
+              <a:spcBef>
+                <a:spcPts val="600"/>
+              </a:spcBef>
+            </a:pPr>
             <a:r>
               <a:rPr lang="en-US" sz="1800" kern="0" dirty="0"/>
               <a:t>Leveraged network contacts with local company - GRTC </a:t>
@@ -4701,30 +4706,74 @@
             </a:r>
           </a:p>
           <a:p>
+            <a:pPr>
+              <a:spcBef>
+                <a:spcPts val="600"/>
+              </a:spcBef>
+            </a:pPr>
             <a:r>
               <a:rPr lang="en-US" sz="1800" kern="0" dirty="0"/>
-              <a:t>Meet with CEO and Data Analyst</a:t>
-            </a:r>
-          </a:p>
-          <a:p>
+              <a:t>Met with CEO and Data Analyst for discovery learning</a:t>
+            </a:r>
+          </a:p>
+          <a:p>
+            <a:pPr>
+              <a:spcBef>
+                <a:spcPts val="600"/>
+              </a:spcBef>
+            </a:pPr>
             <a:r>
               <a:rPr lang="en-US" sz="1800" kern="0" dirty="0"/>
               <a:t>Offered “Ridership” and “On-time” data sets</a:t>
             </a:r>
           </a:p>
           <a:p>
+            <a:pPr>
+              <a:spcBef>
+                <a:spcPts val="600"/>
+              </a:spcBef>
+            </a:pPr>
             <a:r>
               <a:rPr lang="en-US" sz="1800" kern="0" dirty="0"/>
-              <a:t>Selected “Ridership” in interest of time</a:t>
+              <a:t>Selected “Ridership” data set in interest of time</a:t>
+            </a:r>
+          </a:p>
+          <a:p>
+            <a:pPr marL="0" indent="0">
+              <a:buNone/>
+            </a:pPr>
+            <a:r>
+              <a:rPr lang="en-US" sz="1800" b="1" kern="0" dirty="0"/>
+              <a:t>Project Deliverables</a:t>
             </a:r>
           </a:p>
           <a:p>
             <a:r>
               <a:rPr lang="en-US" sz="1800" kern="0" dirty="0"/>
-              <a:t>Project Deliverables</a:t>
-            </a:r>
-          </a:p>
-          <a:p>
+              <a:t>Class &amp; GRTC Presentations</a:t>
+            </a:r>
+          </a:p>
+          <a:p>
+            <a:pPr lvl="1"/>
+            <a:r>
+              <a:rPr lang="en-US" sz="1500" b="1" kern="0" dirty="0"/>
+              <a:t>Tableau Story:  </a:t>
+            </a:r>
+            <a:r>
+              <a:rPr lang="en-US" sz="1500" kern="0" dirty="0"/>
+              <a:t>Target selected route/stops to conduct customer surveys on the “GRTC Ridership Experience”</a:t>
+            </a:r>
+          </a:p>
+          <a:p>
+            <a:pPr lvl="1"/>
+            <a:r>
+              <a:rPr lang="en-US" sz="1500" b="1" kern="0" dirty="0"/>
+              <a:t>Machine Learning:  </a:t>
+            </a:r>
+            <a:r>
+              <a:rPr lang="en-US" sz="1500" kern="0" dirty="0"/>
+              <a:t>Many routes were not classified as “Local” or “Express”.  ML objective to predict that route classification</a:t>
+            </a:r>
             <a:endParaRPr lang="en-US" sz="1800" kern="0" dirty="0"/>
           </a:p>
           <a:p>
@@ -4964,8 +5013,256 @@
           <a:p>
             <a:r>
               <a:rPr lang="en-US" kern="0" dirty="0"/>
-              <a:t>Agenda</a:t>
-            </a:r>
+              <a:t>Tools</a:t>
+            </a:r>
+          </a:p>
+        </p:txBody>
+      </p:sp>
+      <p:sp>
+        <p:nvSpPr>
+          <p:cNvPr id="6" name="Content Placeholder 7">
+            <a:extLst>
+              <a:ext uri="{FF2B5EF4-FFF2-40B4-BE49-F238E27FC236}">
+                <a16:creationId xmlns:a16="http://schemas.microsoft.com/office/drawing/2014/main" id="{2AE801E1-A2FE-42EE-B3E2-2C04A870367B}"/>
+              </a:ext>
+            </a:extLst>
+          </p:cNvPr>
+          <p:cNvSpPr txBox="1">
+            <a:spLocks/>
+          </p:cNvSpPr>
+          <p:nvPr/>
+        </p:nvSpPr>
+        <p:spPr bwMode="auto">
+          <a:xfrm>
+            <a:off x="2044027" y="1591271"/>
+            <a:ext cx="4782901" cy="4566702"/>
+          </a:xfrm>
+          <a:prstGeom prst="rect">
+            <a:avLst/>
+          </a:prstGeom>
+          <a:noFill/>
+          <a:ln w="9525">
+            <a:noFill/>
+            <a:miter lim="800000"/>
+            <a:headEnd/>
+            <a:tailEnd/>
+          </a:ln>
+          <a:effectLst/>
+        </p:spPr>
+        <p:txBody>
+          <a:bodyPr vert="horz" wrap="square" lIns="91440" tIns="45720" rIns="91440" bIns="45720" numCol="1" anchor="t" anchorCtr="0" compatLnSpc="1">
+            <a:prstTxWarp prst="textNoShape">
+              <a:avLst/>
+            </a:prstTxWarp>
+          </a:bodyPr>
+          <a:lstStyle>
+            <a:lvl1pPr marL="342900" indent="-342900" algn="l" rtl="0" fontAlgn="base">
+              <a:spcBef>
+                <a:spcPct val="65000"/>
+              </a:spcBef>
+              <a:spcAft>
+                <a:spcPct val="0"/>
+              </a:spcAft>
+              <a:buChar char="•"/>
+              <a:defRPr sz="2000">
+                <a:solidFill>
+                  <a:schemeClr val="tx1"/>
+                </a:solidFill>
+                <a:latin typeface="+mn-lt"/>
+                <a:ea typeface="+mn-ea"/>
+                <a:cs typeface="+mn-cs"/>
+              </a:defRPr>
+            </a:lvl1pPr>
+            <a:lvl2pPr marL="742950" indent="-285750" algn="l" rtl="0" fontAlgn="base">
+              <a:spcBef>
+                <a:spcPct val="20000"/>
+              </a:spcBef>
+              <a:spcAft>
+                <a:spcPct val="0"/>
+              </a:spcAft>
+              <a:buChar char="–"/>
+              <a:defRPr sz="1700">
+                <a:solidFill>
+                  <a:schemeClr val="tx1"/>
+                </a:solidFill>
+                <a:latin typeface="+mn-lt"/>
+                <a:cs typeface="+mn-cs"/>
+              </a:defRPr>
+            </a:lvl2pPr>
+            <a:lvl3pPr marL="1143000" indent="-228600" algn="l" rtl="0" fontAlgn="base">
+              <a:spcBef>
+                <a:spcPct val="20000"/>
+              </a:spcBef>
+              <a:spcAft>
+                <a:spcPct val="0"/>
+              </a:spcAft>
+              <a:buChar char="•"/>
+              <a:defRPr sz="1700">
+                <a:solidFill>
+                  <a:schemeClr val="tx1"/>
+                </a:solidFill>
+                <a:latin typeface="+mn-lt"/>
+                <a:cs typeface="+mn-cs"/>
+              </a:defRPr>
+            </a:lvl3pPr>
+            <a:lvl4pPr marL="1600200" indent="-228600" algn="l" rtl="0" fontAlgn="base">
+              <a:spcBef>
+                <a:spcPct val="20000"/>
+              </a:spcBef>
+              <a:spcAft>
+                <a:spcPct val="0"/>
+              </a:spcAft>
+              <a:buChar char="–"/>
+              <a:defRPr sz="1700">
+                <a:solidFill>
+                  <a:schemeClr val="tx1"/>
+                </a:solidFill>
+                <a:latin typeface="+mn-lt"/>
+                <a:cs typeface="+mn-cs"/>
+              </a:defRPr>
+            </a:lvl4pPr>
+            <a:lvl5pPr marL="2057400" indent="-228600" algn="l" rtl="0" fontAlgn="base">
+              <a:spcBef>
+                <a:spcPct val="20000"/>
+              </a:spcBef>
+              <a:spcAft>
+                <a:spcPct val="0"/>
+              </a:spcAft>
+              <a:buChar char="»"/>
+              <a:defRPr sz="1700">
+                <a:solidFill>
+                  <a:schemeClr val="tx1"/>
+                </a:solidFill>
+                <a:latin typeface="+mn-lt"/>
+                <a:cs typeface="+mn-cs"/>
+              </a:defRPr>
+            </a:lvl5pPr>
+            <a:lvl6pPr marL="2514600" indent="-228600" algn="l" rtl="0" fontAlgn="base">
+              <a:spcBef>
+                <a:spcPct val="20000"/>
+              </a:spcBef>
+              <a:spcAft>
+                <a:spcPct val="0"/>
+              </a:spcAft>
+              <a:buChar char="»"/>
+              <a:defRPr sz="1700">
+                <a:solidFill>
+                  <a:schemeClr val="tx1"/>
+                </a:solidFill>
+                <a:latin typeface="+mn-lt"/>
+                <a:cs typeface="+mn-cs"/>
+              </a:defRPr>
+            </a:lvl6pPr>
+            <a:lvl7pPr marL="2971800" indent="-228600" algn="l" rtl="0" fontAlgn="base">
+              <a:spcBef>
+                <a:spcPct val="20000"/>
+              </a:spcBef>
+              <a:spcAft>
+                <a:spcPct val="0"/>
+              </a:spcAft>
+              <a:buChar char="»"/>
+              <a:defRPr sz="1700">
+                <a:solidFill>
+                  <a:schemeClr val="tx1"/>
+                </a:solidFill>
+                <a:latin typeface="+mn-lt"/>
+                <a:cs typeface="+mn-cs"/>
+              </a:defRPr>
+            </a:lvl7pPr>
+            <a:lvl8pPr marL="3429000" indent="-228600" algn="l" rtl="0" fontAlgn="base">
+              <a:spcBef>
+                <a:spcPct val="20000"/>
+              </a:spcBef>
+              <a:spcAft>
+                <a:spcPct val="0"/>
+              </a:spcAft>
+              <a:buChar char="»"/>
+              <a:defRPr sz="1700">
+                <a:solidFill>
+                  <a:schemeClr val="tx1"/>
+                </a:solidFill>
+                <a:latin typeface="+mn-lt"/>
+                <a:cs typeface="+mn-cs"/>
+              </a:defRPr>
+            </a:lvl8pPr>
+            <a:lvl9pPr marL="3886200" indent="-228600" algn="l" rtl="0" fontAlgn="base">
+              <a:spcBef>
+                <a:spcPct val="20000"/>
+              </a:spcBef>
+              <a:spcAft>
+                <a:spcPct val="0"/>
+              </a:spcAft>
+              <a:buChar char="»"/>
+              <a:defRPr sz="1700">
+                <a:solidFill>
+                  <a:schemeClr val="tx1"/>
+                </a:solidFill>
+                <a:latin typeface="+mn-lt"/>
+                <a:cs typeface="+mn-cs"/>
+              </a:defRPr>
+            </a:lvl9pPr>
+          </a:lstStyle>
+          <a:p>
+            <a:pPr marL="0" indent="0">
+              <a:buNone/>
+            </a:pPr>
+            <a:r>
+              <a:rPr lang="en-US" sz="1800" b="1" kern="0" dirty="0"/>
+              <a:t>Data Repository</a:t>
+            </a:r>
+          </a:p>
+          <a:p>
+            <a:r>
+              <a:rPr lang="en-US" sz="1800" kern="0" dirty="0"/>
+              <a:t>GitHub</a:t>
+            </a:r>
+          </a:p>
+          <a:p>
+            <a:r>
+              <a:rPr lang="en-US" sz="1800" kern="0" dirty="0"/>
+              <a:t>Google Drive:</a:t>
+            </a:r>
+          </a:p>
+          <a:p>
+            <a:pPr marL="0" indent="0">
+              <a:buNone/>
+            </a:pPr>
+            <a:r>
+              <a:rPr lang="en-US" sz="1800" b="1" kern="0" dirty="0"/>
+              <a:t>Analysis</a:t>
+            </a:r>
+          </a:p>
+          <a:p>
+            <a:r>
+              <a:rPr lang="en-US" sz="1800" kern="0" dirty="0"/>
+              <a:t>Tableau and Tableau Prep</a:t>
+            </a:r>
+          </a:p>
+          <a:p>
+            <a:r>
+              <a:rPr lang="en-US" sz="1800" kern="0" dirty="0"/>
+              <a:t>Python Pandas</a:t>
+            </a:r>
+          </a:p>
+          <a:p>
+            <a:r>
+              <a:rPr lang="en-US" sz="1800" kern="0" dirty="0"/>
+              <a:t>Python </a:t>
+            </a:r>
+            <a:r>
+              <a:rPr lang="en-US" sz="1800" kern="0" dirty="0" err="1"/>
+              <a:t>Scikit</a:t>
+            </a:r>
+            <a:r>
+              <a:rPr lang="en-US" sz="1800" kern="0" dirty="0"/>
+              <a:t>-Learn</a:t>
+            </a:r>
+          </a:p>
+          <a:p>
+            <a:endParaRPr lang="en-US" sz="1800" kern="0" dirty="0"/>
+          </a:p>
+          <a:p>
+            <a:endParaRPr lang="en-US" sz="1800" kern="0" dirty="0"/>
           </a:p>
         </p:txBody>
       </p:sp>
@@ -5201,15 +5498,393 @@
           <a:p>
             <a:r>
               <a:rPr lang="en-US" kern="0" dirty="0"/>
-              <a:t>Agenda</a:t>
-            </a:r>
+              <a:t>Data Preparation</a:t>
+            </a:r>
+          </a:p>
+        </p:txBody>
+      </p:sp>
+      <p:sp>
+        <p:nvSpPr>
+          <p:cNvPr id="6" name="Content Placeholder 7">
+            <a:extLst>
+              <a:ext uri="{FF2B5EF4-FFF2-40B4-BE49-F238E27FC236}">
+                <a16:creationId xmlns:a16="http://schemas.microsoft.com/office/drawing/2014/main" id="{7C6CE29D-9031-4F40-820E-EA3E6EEB6DDC}"/>
+              </a:ext>
+            </a:extLst>
+          </p:cNvPr>
+          <p:cNvSpPr txBox="1">
+            <a:spLocks/>
+          </p:cNvSpPr>
+          <p:nvPr/>
+        </p:nvSpPr>
+        <p:spPr bwMode="auto">
+          <a:xfrm>
+            <a:off x="1344967" y="1118979"/>
+            <a:ext cx="6454065" cy="5605671"/>
+          </a:xfrm>
+          <a:prstGeom prst="rect">
+            <a:avLst/>
+          </a:prstGeom>
+          <a:noFill/>
+          <a:ln w="9525">
+            <a:noFill/>
+            <a:miter lim="800000"/>
+            <a:headEnd/>
+            <a:tailEnd/>
+          </a:ln>
+          <a:effectLst/>
+        </p:spPr>
+        <p:txBody>
+          <a:bodyPr vert="horz" wrap="square" lIns="91440" tIns="45720" rIns="91440" bIns="45720" numCol="1" anchor="t" anchorCtr="0" compatLnSpc="1">
+            <a:prstTxWarp prst="textNoShape">
+              <a:avLst/>
+            </a:prstTxWarp>
+          </a:bodyPr>
+          <a:lstStyle>
+            <a:lvl1pPr marL="342900" indent="-342900" algn="l" rtl="0" fontAlgn="base">
+              <a:spcBef>
+                <a:spcPct val="65000"/>
+              </a:spcBef>
+              <a:spcAft>
+                <a:spcPct val="0"/>
+              </a:spcAft>
+              <a:buChar char="•"/>
+              <a:defRPr sz="2000">
+                <a:solidFill>
+                  <a:schemeClr val="tx1"/>
+                </a:solidFill>
+                <a:latin typeface="+mn-lt"/>
+                <a:ea typeface="+mn-ea"/>
+                <a:cs typeface="+mn-cs"/>
+              </a:defRPr>
+            </a:lvl1pPr>
+            <a:lvl2pPr marL="742950" indent="-285750" algn="l" rtl="0" fontAlgn="base">
+              <a:spcBef>
+                <a:spcPct val="20000"/>
+              </a:spcBef>
+              <a:spcAft>
+                <a:spcPct val="0"/>
+              </a:spcAft>
+              <a:buChar char="–"/>
+              <a:defRPr sz="1700">
+                <a:solidFill>
+                  <a:schemeClr val="tx1"/>
+                </a:solidFill>
+                <a:latin typeface="+mn-lt"/>
+                <a:cs typeface="+mn-cs"/>
+              </a:defRPr>
+            </a:lvl2pPr>
+            <a:lvl3pPr marL="1143000" indent="-228600" algn="l" rtl="0" fontAlgn="base">
+              <a:spcBef>
+                <a:spcPct val="20000"/>
+              </a:spcBef>
+              <a:spcAft>
+                <a:spcPct val="0"/>
+              </a:spcAft>
+              <a:buChar char="•"/>
+              <a:defRPr sz="1700">
+                <a:solidFill>
+                  <a:schemeClr val="tx1"/>
+                </a:solidFill>
+                <a:latin typeface="+mn-lt"/>
+                <a:cs typeface="+mn-cs"/>
+              </a:defRPr>
+            </a:lvl3pPr>
+            <a:lvl4pPr marL="1600200" indent="-228600" algn="l" rtl="0" fontAlgn="base">
+              <a:spcBef>
+                <a:spcPct val="20000"/>
+              </a:spcBef>
+              <a:spcAft>
+                <a:spcPct val="0"/>
+              </a:spcAft>
+              <a:buChar char="–"/>
+              <a:defRPr sz="1700">
+                <a:solidFill>
+                  <a:schemeClr val="tx1"/>
+                </a:solidFill>
+                <a:latin typeface="+mn-lt"/>
+                <a:cs typeface="+mn-cs"/>
+              </a:defRPr>
+            </a:lvl4pPr>
+            <a:lvl5pPr marL="2057400" indent="-228600" algn="l" rtl="0" fontAlgn="base">
+              <a:spcBef>
+                <a:spcPct val="20000"/>
+              </a:spcBef>
+              <a:spcAft>
+                <a:spcPct val="0"/>
+              </a:spcAft>
+              <a:buChar char="»"/>
+              <a:defRPr sz="1700">
+                <a:solidFill>
+                  <a:schemeClr val="tx1"/>
+                </a:solidFill>
+                <a:latin typeface="+mn-lt"/>
+                <a:cs typeface="+mn-cs"/>
+              </a:defRPr>
+            </a:lvl5pPr>
+            <a:lvl6pPr marL="2514600" indent="-228600" algn="l" rtl="0" fontAlgn="base">
+              <a:spcBef>
+                <a:spcPct val="20000"/>
+              </a:spcBef>
+              <a:spcAft>
+                <a:spcPct val="0"/>
+              </a:spcAft>
+              <a:buChar char="»"/>
+              <a:defRPr sz="1700">
+                <a:solidFill>
+                  <a:schemeClr val="tx1"/>
+                </a:solidFill>
+                <a:latin typeface="+mn-lt"/>
+                <a:cs typeface="+mn-cs"/>
+              </a:defRPr>
+            </a:lvl6pPr>
+            <a:lvl7pPr marL="2971800" indent="-228600" algn="l" rtl="0" fontAlgn="base">
+              <a:spcBef>
+                <a:spcPct val="20000"/>
+              </a:spcBef>
+              <a:spcAft>
+                <a:spcPct val="0"/>
+              </a:spcAft>
+              <a:buChar char="»"/>
+              <a:defRPr sz="1700">
+                <a:solidFill>
+                  <a:schemeClr val="tx1"/>
+                </a:solidFill>
+                <a:latin typeface="+mn-lt"/>
+                <a:cs typeface="+mn-cs"/>
+              </a:defRPr>
+            </a:lvl7pPr>
+            <a:lvl8pPr marL="3429000" indent="-228600" algn="l" rtl="0" fontAlgn="base">
+              <a:spcBef>
+                <a:spcPct val="20000"/>
+              </a:spcBef>
+              <a:spcAft>
+                <a:spcPct val="0"/>
+              </a:spcAft>
+              <a:buChar char="»"/>
+              <a:defRPr sz="1700">
+                <a:solidFill>
+                  <a:schemeClr val="tx1"/>
+                </a:solidFill>
+                <a:latin typeface="+mn-lt"/>
+                <a:cs typeface="+mn-cs"/>
+              </a:defRPr>
+            </a:lvl8pPr>
+            <a:lvl9pPr marL="3886200" indent="-228600" algn="l" rtl="0" fontAlgn="base">
+              <a:spcBef>
+                <a:spcPct val="20000"/>
+              </a:spcBef>
+              <a:spcAft>
+                <a:spcPct val="0"/>
+              </a:spcAft>
+              <a:buChar char="»"/>
+              <a:defRPr sz="1700">
+                <a:solidFill>
+                  <a:schemeClr val="tx1"/>
+                </a:solidFill>
+                <a:latin typeface="+mn-lt"/>
+                <a:cs typeface="+mn-cs"/>
+              </a:defRPr>
+            </a:lvl9pPr>
+          </a:lstStyle>
+          <a:p>
+            <a:pPr marL="0" indent="0">
+              <a:buNone/>
+            </a:pPr>
+            <a:r>
+              <a:rPr lang="en-US" sz="1800" b="1" kern="0" dirty="0"/>
+              <a:t>Pre-Analysis</a:t>
+            </a:r>
+          </a:p>
+          <a:p>
+            <a:pPr>
+              <a:spcBef>
+                <a:spcPts val="600"/>
+              </a:spcBef>
+            </a:pPr>
+            <a:r>
+              <a:rPr lang="en-US" sz="1800" kern="0" dirty="0"/>
+              <a:t>Obtained sample data files to munge</a:t>
+            </a:r>
+          </a:p>
+          <a:p>
+            <a:pPr marL="0" indent="0">
+              <a:spcBef>
+                <a:spcPts val="600"/>
+              </a:spcBef>
+              <a:buNone/>
+            </a:pPr>
+            <a:r>
+              <a:rPr lang="en-US" sz="1800" b="1" kern="0" dirty="0"/>
+              <a:t>Extract</a:t>
+            </a:r>
+          </a:p>
+          <a:p>
+            <a:pPr>
+              <a:spcBef>
+                <a:spcPts val="600"/>
+              </a:spcBef>
+            </a:pPr>
+            <a:r>
+              <a:rPr lang="en-US" sz="1800" kern="0" dirty="0"/>
+              <a:t>Data extracts delivered to Google Drive in Excel format</a:t>
+            </a:r>
+          </a:p>
+          <a:p>
+            <a:pPr>
+              <a:spcBef>
+                <a:spcPts val="600"/>
+              </a:spcBef>
+            </a:pPr>
+            <a:r>
+              <a:rPr lang="en-US" sz="1800" kern="0" dirty="0"/>
+              <a:t>12 data sets provided</a:t>
+            </a:r>
+          </a:p>
+          <a:p>
+            <a:pPr lvl="1"/>
+            <a:r>
+              <a:rPr lang="en-US" sz="1500" kern="0" dirty="0"/>
+              <a:t>4 booking date periods</a:t>
+            </a:r>
+          </a:p>
+          <a:p>
+            <a:pPr lvl="1"/>
+            <a:r>
+              <a:rPr lang="en-US" sz="1500" kern="0" dirty="0"/>
+              <a:t>3 grouping by Weekday, Saturday, Sunday</a:t>
+            </a:r>
+          </a:p>
+          <a:p>
+            <a:pPr marL="0" indent="0">
+              <a:spcBef>
+                <a:spcPts val="600"/>
+              </a:spcBef>
+              <a:buNone/>
+            </a:pPr>
+            <a:r>
+              <a:rPr lang="en-US" sz="1800" b="1" kern="0" dirty="0"/>
+              <a:t>Transform</a:t>
+            </a:r>
+          </a:p>
+          <a:p>
+            <a:pPr>
+              <a:spcBef>
+                <a:spcPts val="600"/>
+              </a:spcBef>
+            </a:pPr>
+            <a:r>
+              <a:rPr lang="en-US" sz="1800" kern="0" dirty="0"/>
+              <a:t>Added two columns to data files</a:t>
+            </a:r>
+          </a:p>
+          <a:p>
+            <a:pPr lvl="1"/>
+            <a:r>
+              <a:rPr lang="en-US" sz="1500" kern="0" dirty="0"/>
+              <a:t>Booking date</a:t>
+            </a:r>
+          </a:p>
+          <a:p>
+            <a:pPr lvl="1"/>
+            <a:r>
+              <a:rPr lang="en-US" sz="1500" kern="0" dirty="0"/>
+              <a:t>Week Type (weekday, </a:t>
+            </a:r>
+            <a:r>
+              <a:rPr lang="en-US" sz="1500" kern="0" dirty="0" err="1"/>
+              <a:t>Saurday</a:t>
+            </a:r>
+            <a:r>
+              <a:rPr lang="en-US" sz="1500" kern="0" dirty="0"/>
+              <a:t>, or Sunday)</a:t>
+            </a:r>
+          </a:p>
+          <a:p>
+            <a:pPr>
+              <a:spcBef>
+                <a:spcPts val="600"/>
+              </a:spcBef>
+            </a:pPr>
+            <a:r>
+              <a:rPr lang="en-US" sz="1800" kern="0" dirty="0"/>
+              <a:t>Saved files as CSV</a:t>
+            </a:r>
+          </a:p>
+          <a:p>
+            <a:pPr>
+              <a:spcBef>
+                <a:spcPts val="600"/>
+              </a:spcBef>
+            </a:pPr>
+            <a:r>
+              <a:rPr lang="en-US" sz="1800" kern="0" dirty="0"/>
+              <a:t>Used Pandas to consolidate the 12 data files</a:t>
+            </a:r>
+          </a:p>
+          <a:p>
+            <a:pPr>
+              <a:spcBef>
+                <a:spcPts val="600"/>
+              </a:spcBef>
+            </a:pPr>
+            <a:r>
+              <a:rPr lang="en-US" sz="1800" kern="0" dirty="0"/>
+              <a:t>Used Panda to write a consolidated CSV file</a:t>
+            </a:r>
+          </a:p>
+          <a:p>
+            <a:pPr marL="0" indent="0">
+              <a:spcBef>
+                <a:spcPts val="600"/>
+              </a:spcBef>
+              <a:buNone/>
+            </a:pPr>
+            <a:r>
+              <a:rPr lang="en-US" sz="1800" b="1" kern="0" dirty="0"/>
+              <a:t>Load</a:t>
+            </a:r>
+          </a:p>
+          <a:p>
+            <a:pPr>
+              <a:spcBef>
+                <a:spcPts val="600"/>
+              </a:spcBef>
+            </a:pPr>
+            <a:r>
+              <a:rPr lang="en-US" sz="1800" kern="0" dirty="0"/>
+              <a:t>Used CSV files for Tableau data source</a:t>
+            </a:r>
+          </a:p>
+          <a:p>
+            <a:pPr>
+              <a:spcBef>
+                <a:spcPts val="600"/>
+              </a:spcBef>
+            </a:pPr>
+            <a:r>
+              <a:rPr lang="en-US" sz="1800" kern="0" dirty="0"/>
+              <a:t>Used CSV files for Pandas Machine Learning</a:t>
+            </a:r>
+          </a:p>
+          <a:p>
+            <a:pPr marL="0" indent="0">
+              <a:buNone/>
+            </a:pPr>
+            <a:endParaRPr lang="en-US" sz="1800" kern="0" dirty="0"/>
+          </a:p>
+          <a:p>
+            <a:endParaRPr lang="en-US" sz="1800" kern="0" dirty="0"/>
+          </a:p>
+          <a:p>
+            <a:endParaRPr lang="en-US" sz="1800" kern="0" dirty="0"/>
           </a:p>
         </p:txBody>
       </p:sp>
     </p:spTree>
     <p:extLst>
       <p:ext uri="{BB962C8B-B14F-4D97-AF65-F5344CB8AC3E}">
-        <p14:creationId xmlns:p14="http://schemas.microsoft.com/office/powerpoint/2010/main" val="4287807543"/>
+        <p14:creationId xmlns:p14="http://schemas.microsoft.com/office/powerpoint/2010/main" val="995744374"/>
       </p:ext>
     </p:extLst>
   </p:cSld>
@@ -5438,15 +6113,292 @@
           <a:p>
             <a:r>
               <a:rPr lang="en-US" kern="0" dirty="0"/>
-              <a:t>Agenda</a:t>
-            </a:r>
+              <a:t>Analysis</a:t>
+            </a:r>
+          </a:p>
+        </p:txBody>
+      </p:sp>
+      <p:sp>
+        <p:nvSpPr>
+          <p:cNvPr id="6" name="Content Placeholder 7">
+            <a:extLst>
+              <a:ext uri="{FF2B5EF4-FFF2-40B4-BE49-F238E27FC236}">
+                <a16:creationId xmlns:a16="http://schemas.microsoft.com/office/drawing/2014/main" id="{D7CAEDF0-2598-4836-BFD6-AE03CEF533D6}"/>
+              </a:ext>
+            </a:extLst>
+          </p:cNvPr>
+          <p:cNvSpPr txBox="1">
+            <a:spLocks/>
+          </p:cNvSpPr>
+          <p:nvPr/>
+        </p:nvSpPr>
+        <p:spPr bwMode="auto">
+          <a:xfrm>
+            <a:off x="1102994" y="1256135"/>
+            <a:ext cx="7023735" cy="4951572"/>
+          </a:xfrm>
+          <a:prstGeom prst="rect">
+            <a:avLst/>
+          </a:prstGeom>
+          <a:noFill/>
+          <a:ln w="9525">
+            <a:noFill/>
+            <a:miter lim="800000"/>
+            <a:headEnd/>
+            <a:tailEnd/>
+          </a:ln>
+          <a:effectLst/>
+        </p:spPr>
+        <p:txBody>
+          <a:bodyPr vert="horz" wrap="square" lIns="91440" tIns="45720" rIns="91440" bIns="45720" numCol="1" anchor="t" anchorCtr="0" compatLnSpc="1">
+            <a:prstTxWarp prst="textNoShape">
+              <a:avLst/>
+            </a:prstTxWarp>
+          </a:bodyPr>
+          <a:lstStyle>
+            <a:lvl1pPr marL="342900" indent="-342900" algn="l" rtl="0" fontAlgn="base">
+              <a:spcBef>
+                <a:spcPct val="65000"/>
+              </a:spcBef>
+              <a:spcAft>
+                <a:spcPct val="0"/>
+              </a:spcAft>
+              <a:buChar char="•"/>
+              <a:defRPr sz="2000">
+                <a:solidFill>
+                  <a:schemeClr val="tx1"/>
+                </a:solidFill>
+                <a:latin typeface="+mn-lt"/>
+                <a:ea typeface="+mn-ea"/>
+                <a:cs typeface="+mn-cs"/>
+              </a:defRPr>
+            </a:lvl1pPr>
+            <a:lvl2pPr marL="742950" indent="-285750" algn="l" rtl="0" fontAlgn="base">
+              <a:spcBef>
+                <a:spcPct val="20000"/>
+              </a:spcBef>
+              <a:spcAft>
+                <a:spcPct val="0"/>
+              </a:spcAft>
+              <a:buChar char="–"/>
+              <a:defRPr sz="1700">
+                <a:solidFill>
+                  <a:schemeClr val="tx1"/>
+                </a:solidFill>
+                <a:latin typeface="+mn-lt"/>
+                <a:cs typeface="+mn-cs"/>
+              </a:defRPr>
+            </a:lvl2pPr>
+            <a:lvl3pPr marL="1143000" indent="-228600" algn="l" rtl="0" fontAlgn="base">
+              <a:spcBef>
+                <a:spcPct val="20000"/>
+              </a:spcBef>
+              <a:spcAft>
+                <a:spcPct val="0"/>
+              </a:spcAft>
+              <a:buChar char="•"/>
+              <a:defRPr sz="1700">
+                <a:solidFill>
+                  <a:schemeClr val="tx1"/>
+                </a:solidFill>
+                <a:latin typeface="+mn-lt"/>
+                <a:cs typeface="+mn-cs"/>
+              </a:defRPr>
+            </a:lvl3pPr>
+            <a:lvl4pPr marL="1600200" indent="-228600" algn="l" rtl="0" fontAlgn="base">
+              <a:spcBef>
+                <a:spcPct val="20000"/>
+              </a:spcBef>
+              <a:spcAft>
+                <a:spcPct val="0"/>
+              </a:spcAft>
+              <a:buChar char="–"/>
+              <a:defRPr sz="1700">
+                <a:solidFill>
+                  <a:schemeClr val="tx1"/>
+                </a:solidFill>
+                <a:latin typeface="+mn-lt"/>
+                <a:cs typeface="+mn-cs"/>
+              </a:defRPr>
+            </a:lvl4pPr>
+            <a:lvl5pPr marL="2057400" indent="-228600" algn="l" rtl="0" fontAlgn="base">
+              <a:spcBef>
+                <a:spcPct val="20000"/>
+              </a:spcBef>
+              <a:spcAft>
+                <a:spcPct val="0"/>
+              </a:spcAft>
+              <a:buChar char="»"/>
+              <a:defRPr sz="1700">
+                <a:solidFill>
+                  <a:schemeClr val="tx1"/>
+                </a:solidFill>
+                <a:latin typeface="+mn-lt"/>
+                <a:cs typeface="+mn-cs"/>
+              </a:defRPr>
+            </a:lvl5pPr>
+            <a:lvl6pPr marL="2514600" indent="-228600" algn="l" rtl="0" fontAlgn="base">
+              <a:spcBef>
+                <a:spcPct val="20000"/>
+              </a:spcBef>
+              <a:spcAft>
+                <a:spcPct val="0"/>
+              </a:spcAft>
+              <a:buChar char="»"/>
+              <a:defRPr sz="1700">
+                <a:solidFill>
+                  <a:schemeClr val="tx1"/>
+                </a:solidFill>
+                <a:latin typeface="+mn-lt"/>
+                <a:cs typeface="+mn-cs"/>
+              </a:defRPr>
+            </a:lvl6pPr>
+            <a:lvl7pPr marL="2971800" indent="-228600" algn="l" rtl="0" fontAlgn="base">
+              <a:spcBef>
+                <a:spcPct val="20000"/>
+              </a:spcBef>
+              <a:spcAft>
+                <a:spcPct val="0"/>
+              </a:spcAft>
+              <a:buChar char="»"/>
+              <a:defRPr sz="1700">
+                <a:solidFill>
+                  <a:schemeClr val="tx1"/>
+                </a:solidFill>
+                <a:latin typeface="+mn-lt"/>
+                <a:cs typeface="+mn-cs"/>
+              </a:defRPr>
+            </a:lvl7pPr>
+            <a:lvl8pPr marL="3429000" indent="-228600" algn="l" rtl="0" fontAlgn="base">
+              <a:spcBef>
+                <a:spcPct val="20000"/>
+              </a:spcBef>
+              <a:spcAft>
+                <a:spcPct val="0"/>
+              </a:spcAft>
+              <a:buChar char="»"/>
+              <a:defRPr sz="1700">
+                <a:solidFill>
+                  <a:schemeClr val="tx1"/>
+                </a:solidFill>
+                <a:latin typeface="+mn-lt"/>
+                <a:cs typeface="+mn-cs"/>
+              </a:defRPr>
+            </a:lvl8pPr>
+            <a:lvl9pPr marL="3886200" indent="-228600" algn="l" rtl="0" fontAlgn="base">
+              <a:spcBef>
+                <a:spcPct val="20000"/>
+              </a:spcBef>
+              <a:spcAft>
+                <a:spcPct val="0"/>
+              </a:spcAft>
+              <a:buChar char="»"/>
+              <a:defRPr sz="1700">
+                <a:solidFill>
+                  <a:schemeClr val="tx1"/>
+                </a:solidFill>
+                <a:latin typeface="+mn-lt"/>
+                <a:cs typeface="+mn-cs"/>
+              </a:defRPr>
+            </a:lvl9pPr>
+          </a:lstStyle>
+          <a:p>
+            <a:pPr marL="0" indent="0">
+              <a:buNone/>
+            </a:pPr>
+            <a:r>
+              <a:rPr lang="en-US" sz="1800" b="1" kern="0" dirty="0"/>
+              <a:t>Tableau</a:t>
+            </a:r>
+          </a:p>
+          <a:p>
+            <a:r>
+              <a:rPr lang="en-US" sz="1800" kern="0" dirty="0"/>
+              <a:t>Data was semi-summarized, not transactional</a:t>
+            </a:r>
+          </a:p>
+          <a:p>
+            <a:r>
+              <a:rPr lang="en-US" sz="1800" kern="0" dirty="0"/>
+              <a:t>Assessed data from a perspective of dimensions and measures</a:t>
+            </a:r>
+          </a:p>
+          <a:p>
+            <a:r>
+              <a:rPr lang="en-US" sz="1800" kern="0" dirty="0"/>
+              <a:t>Took a holistic approach to understand what the data really presented</a:t>
+            </a:r>
+          </a:p>
+          <a:p>
+            <a:r>
+              <a:rPr lang="en-US" sz="1800" kern="0" dirty="0"/>
+              <a:t>Developed ideas on paths that we felt that the data support</a:t>
+            </a:r>
+          </a:p>
+          <a:p>
+            <a:pPr marL="0" indent="0">
+              <a:buNone/>
+            </a:pPr>
+            <a:r>
+              <a:rPr lang="en-US" sz="1800" b="1" kern="0" dirty="0"/>
+              <a:t>Machine Learning</a:t>
+            </a:r>
+          </a:p>
+          <a:p>
+            <a:r>
+              <a:rPr lang="en-US" sz="1800" kern="0" dirty="0"/>
+              <a:t>Used Tableau Prep, Tableau, Pandas to examine/clean the data</a:t>
+            </a:r>
+          </a:p>
+          <a:p>
+            <a:r>
+              <a:rPr lang="en-US" sz="1800" kern="0" dirty="0"/>
+              <a:t>Created four models:</a:t>
+            </a:r>
+          </a:p>
+          <a:p>
+            <a:pPr lvl="1"/>
+            <a:r>
+              <a:rPr lang="en-US" sz="1500" kern="0" dirty="0"/>
+              <a:t>Logistics Regress</a:t>
+            </a:r>
+          </a:p>
+          <a:p>
+            <a:pPr lvl="1"/>
+            <a:r>
+              <a:rPr lang="en-US" sz="1500" kern="0" dirty="0"/>
+              <a:t>K Nearest Neighbors (KNN)</a:t>
+            </a:r>
+          </a:p>
+          <a:p>
+            <a:pPr lvl="1"/>
+            <a:r>
+              <a:rPr lang="en-US" sz="1500" kern="0" dirty="0"/>
+              <a:t>Support Vector Machine (SVM) </a:t>
+            </a:r>
+          </a:p>
+          <a:p>
+            <a:pPr lvl="1"/>
+            <a:r>
+              <a:rPr lang="en-US" sz="1500" kern="0" dirty="0"/>
+              <a:t>Random Forest Classifier</a:t>
+            </a:r>
+          </a:p>
+          <a:p>
+            <a:r>
+              <a:rPr lang="en-US" sz="1800" kern="0" dirty="0"/>
+              <a:t>Best model Random Forest Classifier with accuracy ~99%</a:t>
+            </a:r>
+          </a:p>
+          <a:p>
+            <a:endParaRPr lang="en-US" sz="1800" kern="0" dirty="0"/>
           </a:p>
         </p:txBody>
       </p:sp>
     </p:spTree>
     <p:extLst>
       <p:ext uri="{BB962C8B-B14F-4D97-AF65-F5344CB8AC3E}">
-        <p14:creationId xmlns:p14="http://schemas.microsoft.com/office/powerpoint/2010/main" val="2219684185"/>
+        <p14:creationId xmlns:p14="http://schemas.microsoft.com/office/powerpoint/2010/main" val="4287807543"/>
       </p:ext>
     </p:extLst>
   </p:cSld>
@@ -5675,15 +6627,222 @@
           <a:p>
             <a:r>
               <a:rPr lang="en-US" kern="0" dirty="0"/>
-              <a:t>Agenda</a:t>
-            </a:r>
+              <a:t>Conclusions</a:t>
+            </a:r>
+          </a:p>
+        </p:txBody>
+      </p:sp>
+      <p:sp>
+        <p:nvSpPr>
+          <p:cNvPr id="6" name="Content Placeholder 7">
+            <a:extLst>
+              <a:ext uri="{FF2B5EF4-FFF2-40B4-BE49-F238E27FC236}">
+                <a16:creationId xmlns:a16="http://schemas.microsoft.com/office/drawing/2014/main" id="{2D06E2EF-637A-4B51-8FB4-D5B75B95621B}"/>
+              </a:ext>
+            </a:extLst>
+          </p:cNvPr>
+          <p:cNvSpPr txBox="1">
+            <a:spLocks/>
+          </p:cNvSpPr>
+          <p:nvPr/>
+        </p:nvSpPr>
+        <p:spPr bwMode="auto">
+          <a:xfrm>
+            <a:off x="1102994" y="1256135"/>
+            <a:ext cx="7023735" cy="4951572"/>
+          </a:xfrm>
+          <a:prstGeom prst="rect">
+            <a:avLst/>
+          </a:prstGeom>
+          <a:noFill/>
+          <a:ln w="9525">
+            <a:noFill/>
+            <a:miter lim="800000"/>
+            <a:headEnd/>
+            <a:tailEnd/>
+          </a:ln>
+          <a:effectLst/>
+        </p:spPr>
+        <p:txBody>
+          <a:bodyPr vert="horz" wrap="square" lIns="91440" tIns="45720" rIns="91440" bIns="45720" numCol="1" anchor="t" anchorCtr="0" compatLnSpc="1">
+            <a:prstTxWarp prst="textNoShape">
+              <a:avLst/>
+            </a:prstTxWarp>
+          </a:bodyPr>
+          <a:lstStyle>
+            <a:lvl1pPr marL="342900" indent="-342900" algn="l" rtl="0" fontAlgn="base">
+              <a:spcBef>
+                <a:spcPct val="65000"/>
+              </a:spcBef>
+              <a:spcAft>
+                <a:spcPct val="0"/>
+              </a:spcAft>
+              <a:buChar char="•"/>
+              <a:defRPr sz="2000">
+                <a:solidFill>
+                  <a:schemeClr val="tx1"/>
+                </a:solidFill>
+                <a:latin typeface="+mn-lt"/>
+                <a:ea typeface="+mn-ea"/>
+                <a:cs typeface="+mn-cs"/>
+              </a:defRPr>
+            </a:lvl1pPr>
+            <a:lvl2pPr marL="742950" indent="-285750" algn="l" rtl="0" fontAlgn="base">
+              <a:spcBef>
+                <a:spcPct val="20000"/>
+              </a:spcBef>
+              <a:spcAft>
+                <a:spcPct val="0"/>
+              </a:spcAft>
+              <a:buChar char="–"/>
+              <a:defRPr sz="1700">
+                <a:solidFill>
+                  <a:schemeClr val="tx1"/>
+                </a:solidFill>
+                <a:latin typeface="+mn-lt"/>
+                <a:cs typeface="+mn-cs"/>
+              </a:defRPr>
+            </a:lvl2pPr>
+            <a:lvl3pPr marL="1143000" indent="-228600" algn="l" rtl="0" fontAlgn="base">
+              <a:spcBef>
+                <a:spcPct val="20000"/>
+              </a:spcBef>
+              <a:spcAft>
+                <a:spcPct val="0"/>
+              </a:spcAft>
+              <a:buChar char="•"/>
+              <a:defRPr sz="1700">
+                <a:solidFill>
+                  <a:schemeClr val="tx1"/>
+                </a:solidFill>
+                <a:latin typeface="+mn-lt"/>
+                <a:cs typeface="+mn-cs"/>
+              </a:defRPr>
+            </a:lvl3pPr>
+            <a:lvl4pPr marL="1600200" indent="-228600" algn="l" rtl="0" fontAlgn="base">
+              <a:spcBef>
+                <a:spcPct val="20000"/>
+              </a:spcBef>
+              <a:spcAft>
+                <a:spcPct val="0"/>
+              </a:spcAft>
+              <a:buChar char="–"/>
+              <a:defRPr sz="1700">
+                <a:solidFill>
+                  <a:schemeClr val="tx1"/>
+                </a:solidFill>
+                <a:latin typeface="+mn-lt"/>
+                <a:cs typeface="+mn-cs"/>
+              </a:defRPr>
+            </a:lvl4pPr>
+            <a:lvl5pPr marL="2057400" indent="-228600" algn="l" rtl="0" fontAlgn="base">
+              <a:spcBef>
+                <a:spcPct val="20000"/>
+              </a:spcBef>
+              <a:spcAft>
+                <a:spcPct val="0"/>
+              </a:spcAft>
+              <a:buChar char="»"/>
+              <a:defRPr sz="1700">
+                <a:solidFill>
+                  <a:schemeClr val="tx1"/>
+                </a:solidFill>
+                <a:latin typeface="+mn-lt"/>
+                <a:cs typeface="+mn-cs"/>
+              </a:defRPr>
+            </a:lvl5pPr>
+            <a:lvl6pPr marL="2514600" indent="-228600" algn="l" rtl="0" fontAlgn="base">
+              <a:spcBef>
+                <a:spcPct val="20000"/>
+              </a:spcBef>
+              <a:spcAft>
+                <a:spcPct val="0"/>
+              </a:spcAft>
+              <a:buChar char="»"/>
+              <a:defRPr sz="1700">
+                <a:solidFill>
+                  <a:schemeClr val="tx1"/>
+                </a:solidFill>
+                <a:latin typeface="+mn-lt"/>
+                <a:cs typeface="+mn-cs"/>
+              </a:defRPr>
+            </a:lvl6pPr>
+            <a:lvl7pPr marL="2971800" indent="-228600" algn="l" rtl="0" fontAlgn="base">
+              <a:spcBef>
+                <a:spcPct val="20000"/>
+              </a:spcBef>
+              <a:spcAft>
+                <a:spcPct val="0"/>
+              </a:spcAft>
+              <a:buChar char="»"/>
+              <a:defRPr sz="1700">
+                <a:solidFill>
+                  <a:schemeClr val="tx1"/>
+                </a:solidFill>
+                <a:latin typeface="+mn-lt"/>
+                <a:cs typeface="+mn-cs"/>
+              </a:defRPr>
+            </a:lvl7pPr>
+            <a:lvl8pPr marL="3429000" indent="-228600" algn="l" rtl="0" fontAlgn="base">
+              <a:spcBef>
+                <a:spcPct val="20000"/>
+              </a:spcBef>
+              <a:spcAft>
+                <a:spcPct val="0"/>
+              </a:spcAft>
+              <a:buChar char="»"/>
+              <a:defRPr sz="1700">
+                <a:solidFill>
+                  <a:schemeClr val="tx1"/>
+                </a:solidFill>
+                <a:latin typeface="+mn-lt"/>
+                <a:cs typeface="+mn-cs"/>
+              </a:defRPr>
+            </a:lvl8pPr>
+            <a:lvl9pPr marL="3886200" indent="-228600" algn="l" rtl="0" fontAlgn="base">
+              <a:spcBef>
+                <a:spcPct val="20000"/>
+              </a:spcBef>
+              <a:spcAft>
+                <a:spcPct val="0"/>
+              </a:spcAft>
+              <a:buChar char="»"/>
+              <a:defRPr sz="1700">
+                <a:solidFill>
+                  <a:schemeClr val="tx1"/>
+                </a:solidFill>
+                <a:latin typeface="+mn-lt"/>
+                <a:cs typeface="+mn-cs"/>
+              </a:defRPr>
+            </a:lvl9pPr>
+          </a:lstStyle>
+          <a:p>
+            <a:r>
+              <a:rPr lang="en-US" sz="1800" kern="0" dirty="0"/>
+              <a:t>Within the GRTC Ridership dataset there are a number of factors which can used to accurately characterize a route (and stop) as being a Local Route or an Express Route</a:t>
+            </a:r>
+          </a:p>
+          <a:p>
+            <a:r>
+              <a:rPr lang="en-US" sz="1800" kern="0" dirty="0"/>
+              <a:t>A visual examination of these factors using Tableau show a difference in performance metrics for stops associated with a Local vs. an Express Route</a:t>
+            </a:r>
+          </a:p>
+          <a:p>
+            <a:r>
+              <a:rPr lang="en-US" sz="1800" kern="0" dirty="0"/>
+              <a:t>GRTC might benefit from a review of their current performance metrics to better account for the differences in objects and performance (as identified in this project) between Local and Express routes (and their stops) </a:t>
+            </a:r>
+          </a:p>
+          <a:p>
+            <a:endParaRPr lang="en-US" sz="1800" kern="0" dirty="0"/>
           </a:p>
         </p:txBody>
       </p:sp>
     </p:spTree>
     <p:extLst>
       <p:ext uri="{BB962C8B-B14F-4D97-AF65-F5344CB8AC3E}">
-        <p14:creationId xmlns:p14="http://schemas.microsoft.com/office/powerpoint/2010/main" val="995744374"/>
+        <p14:creationId xmlns:p14="http://schemas.microsoft.com/office/powerpoint/2010/main" val="2219684185"/>
       </p:ext>
     </p:extLst>
   </p:cSld>
@@ -7101,76 +8260,6 @@
 </file>
 
 <file path=customXml/item1.xml><?xml version="1.0" encoding="utf-8"?>
-<?mso-contentType ?>
-<FormTemplates xmlns="http://schemas.microsoft.com/sharepoint/v3/contenttype/forms">
-  <Display>DocumentLibraryForm</Display>
-  <Edit>DocumentLibraryForm</Edit>
-  <New>DocumentLibraryForm</New>
-</FormTemplates>
-</file>
-
-<file path=customXml/item2.xml><?xml version="1.0" encoding="utf-8"?>
-<p:properties xmlns:p="http://schemas.microsoft.com/office/2006/metadata/properties" xmlns:xsi="http://www.w3.org/2001/XMLSchema-instance" xmlns:pc="http://schemas.microsoft.com/office/infopath/2007/PartnerControls">
-  <documentManagement>
-    <NGCENTMigratedNotes xmlns="ba5c2ff5-18fb-4711-8831-7a91b9c32f36" xsi:nil="true"/>
-    <e15ccd119fb74fd7baadd5fc37145f51 xmlns="ba5c2ff5-18fb-4711-8831-7a91b9c32f36">
-      <Terms xmlns="http://schemas.microsoft.com/office/infopath/2007/PartnerControls"/>
-    </e15ccd119fb74fd7baadd5fc37145f51>
-    <NGCENTOwnerString xmlns="ba5c2ff5-18fb-4711-8831-7a91b9c32f36" xsi:nil="true"/>
-    <NGCENTDescription xmlns="ba5c2ff5-18fb-4711-8831-7a91b9c32f36" xsi:nil="true"/>
-    <NGCENTOriginalLocation xmlns="ba5c2ff5-18fb-4711-8831-7a91b9c32f36" xsi:nil="true"/>
-    <Business_x0020_Unit xmlns="ba5c2ff5-18fb-4711-8831-7a91b9c32f36" xsi:nil="true"/>
-    <NGCENTTeam xmlns="ba5c2ff5-18fb-4711-8831-7a91b9c32f36" xsi:nil="true"/>
-    <NGCENTMigratedOriginalFilename xmlns="ba5c2ff5-18fb-4711-8831-7a91b9c32f36" xsi:nil="true"/>
-    <NGCENTDocumentAuthor xmlns="ba5c2ff5-18fb-4711-8831-7a91b9c32f36">
-      <UserInfo>
-        <DisplayName/>
-        <AccountId xsi:nil="true"/>
-        <AccountType/>
-      </UserInfo>
-    </NGCENTDocumentAuthor>
-    <db1f98847b414a48afdff26e6d25506c xmlns="ba5c2ff5-18fb-4711-8831-7a91b9c32f36">
-      <Terms xmlns="http://schemas.microsoft.com/office/infopath/2007/PartnerControls">
-        <TermInfo xmlns="http://schemas.microsoft.com/office/infopath/2007/PartnerControls">
-          <TermName xmlns="http://schemas.microsoft.com/office/infopath/2007/PartnerControls">United States (US)</TermName>
-          <TermId xmlns="http://schemas.microsoft.com/office/infopath/2007/PartnerControls">f4f4ed40-0317-491b-9959-5ea628d96313</TermId>
-        </TermInfo>
-      </Terms>
-    </db1f98847b414a48afdff26e6d25506c>
-    <NGCENTDocumentOwner xmlns="ba5c2ff5-18fb-4711-8831-7a91b9c32f36">
-      <UserInfo>
-        <DisplayName/>
-        <AccountId xsi:nil="true"/>
-        <AccountType/>
-      </UserInfo>
-    </NGCENTDocumentOwner>
-    <NGCENTOrganization xmlns="ba5c2ff5-18fb-4711-8831-7a91b9c32f36">Land &amp; Avionics C4ISR Division</NGCENTOrganization>
-    <NGCENTWorkProduct xmlns="ba5c2ff5-18fb-4711-8831-7a91b9c32f36" xsi:nil="true"/>
-    <NGCENTProgram xmlns="ba5c2ff5-18fb-4711-8831-7a91b9c32f36" xsi:nil="true"/>
-    <NGCENTAuthorString xmlns="ba5c2ff5-18fb-4711-8831-7a91b9c32f36" xsi:nil="true"/>
-    <Customer xmlns="ba5c2ff5-18fb-4711-8831-7a91b9c32f36" xsi:nil="true"/>
-    <Operating_x0020_Unit xmlns="ba5c2ff5-18fb-4711-8831-7a91b9c32f36" xsi:nil="true"/>
-    <NGCENTItemType xmlns="ba5c2ff5-18fb-4711-8831-7a91b9c32f36" xsi:nil="true"/>
-    <NGCENTDivision xmlns="ba5c2ff5-18fb-4711-8831-7a91b9c32f36" xsi:nil="true"/>
-    <NGCENTOriginalSourceId xmlns="ba5c2ff5-18fb-4711-8831-7a91b9c32f36" xsi:nil="true"/>
-    <NGCENTProductLines xmlns="ba5c2ff5-18fb-4711-8831-7a91b9c32f36"/>
-    <kd979d3d42bb49bd8c59d13000e6e225 xmlns="ba5c2ff5-18fb-4711-8831-7a91b9c32f36">
-      <Terms xmlns="http://schemas.microsoft.com/office/infopath/2007/PartnerControls">
-        <TermInfo xmlns="http://schemas.microsoft.com/office/infopath/2007/PartnerControls">
-          <TermName xmlns="http://schemas.microsoft.com/office/infopath/2007/PartnerControls">Mission Systems (MS)</TermName>
-          <TermId xmlns="http://schemas.microsoft.com/office/infopath/2007/PartnerControls">d68bdba8-7e6a-40ac-9c78-5bd95e88fcf8</TermId>
-        </TermInfo>
-      </Terms>
-    </kd979d3d42bb49bd8c59d13000e6e225>
-    <TaxCatchAll xmlns="ba5c2ff5-18fb-4711-8831-7a91b9c32f36">
-      <Value>2</Value>
-      <Value>1</Value>
-    </TaxCatchAll>
-  </documentManagement>
-</p:properties>
-</file>
-
-<file path=customXml/item3.xml><?xml version="1.0" encoding="utf-8"?>
 <ct:contentTypeSchema xmlns:ct="http://schemas.microsoft.com/office/2006/metadata/contentType" xmlns:ma="http://schemas.microsoft.com/office/2006/metadata/properties/metaAttributes" ct:_="" ma:_="" ma:contentTypeName="_Document" ma:contentTypeID="0x0101002F5E26F338044317906CD20503C3F6300003EC7B059CD2424EA831CF285ABA111C" ma:contentTypeVersion="6" ma:contentTypeDescription="Base NGC document content type containing core fields that should be available on ALL documents in the site collection" ma:contentTypeScope="" ma:versionID="0b1c68ad84a16ed8ea335fef03a640a5">
   <xsd:schema xmlns:xsd="http://www.w3.org/2001/XMLSchema" xmlns:xs="http://www.w3.org/2001/XMLSchema" xmlns:p="http://schemas.microsoft.com/office/2006/metadata/properties" xmlns:ns2="ba5c2ff5-18fb-4711-8831-7a91b9c32f36" targetNamespace="http://schemas.microsoft.com/office/2006/metadata/properties" ma:root="true" ma:fieldsID="43a389a6b506b9eaa300f559fb6bdbd1" ns2:_="">
     <xsd:import namespace="ba5c2ff5-18fb-4711-8831-7a91b9c32f36"/>
@@ -7676,6 +8765,76 @@
 </ct:contentTypeSchema>
 </file>
 
+<file path=customXml/item2.xml><?xml version="1.0" encoding="utf-8"?>
+<p:properties xmlns:p="http://schemas.microsoft.com/office/2006/metadata/properties" xmlns:xsi="http://www.w3.org/2001/XMLSchema-instance" xmlns:pc="http://schemas.microsoft.com/office/infopath/2007/PartnerControls">
+  <documentManagement>
+    <NGCENTMigratedNotes xmlns="ba5c2ff5-18fb-4711-8831-7a91b9c32f36" xsi:nil="true"/>
+    <e15ccd119fb74fd7baadd5fc37145f51 xmlns="ba5c2ff5-18fb-4711-8831-7a91b9c32f36">
+      <Terms xmlns="http://schemas.microsoft.com/office/infopath/2007/PartnerControls"/>
+    </e15ccd119fb74fd7baadd5fc37145f51>
+    <NGCENTOwnerString xmlns="ba5c2ff5-18fb-4711-8831-7a91b9c32f36" xsi:nil="true"/>
+    <NGCENTDescription xmlns="ba5c2ff5-18fb-4711-8831-7a91b9c32f36" xsi:nil="true"/>
+    <NGCENTOriginalLocation xmlns="ba5c2ff5-18fb-4711-8831-7a91b9c32f36" xsi:nil="true"/>
+    <Business_x0020_Unit xmlns="ba5c2ff5-18fb-4711-8831-7a91b9c32f36" xsi:nil="true"/>
+    <NGCENTTeam xmlns="ba5c2ff5-18fb-4711-8831-7a91b9c32f36" xsi:nil="true"/>
+    <NGCENTMigratedOriginalFilename xmlns="ba5c2ff5-18fb-4711-8831-7a91b9c32f36" xsi:nil="true"/>
+    <NGCENTDocumentAuthor xmlns="ba5c2ff5-18fb-4711-8831-7a91b9c32f36">
+      <UserInfo>
+        <DisplayName/>
+        <AccountId xsi:nil="true"/>
+        <AccountType/>
+      </UserInfo>
+    </NGCENTDocumentAuthor>
+    <db1f98847b414a48afdff26e6d25506c xmlns="ba5c2ff5-18fb-4711-8831-7a91b9c32f36">
+      <Terms xmlns="http://schemas.microsoft.com/office/infopath/2007/PartnerControls">
+        <TermInfo xmlns="http://schemas.microsoft.com/office/infopath/2007/PartnerControls">
+          <TermName xmlns="http://schemas.microsoft.com/office/infopath/2007/PartnerControls">United States (US)</TermName>
+          <TermId xmlns="http://schemas.microsoft.com/office/infopath/2007/PartnerControls">f4f4ed40-0317-491b-9959-5ea628d96313</TermId>
+        </TermInfo>
+      </Terms>
+    </db1f98847b414a48afdff26e6d25506c>
+    <NGCENTDocumentOwner xmlns="ba5c2ff5-18fb-4711-8831-7a91b9c32f36">
+      <UserInfo>
+        <DisplayName/>
+        <AccountId xsi:nil="true"/>
+        <AccountType/>
+      </UserInfo>
+    </NGCENTDocumentOwner>
+    <NGCENTOrganization xmlns="ba5c2ff5-18fb-4711-8831-7a91b9c32f36">Land &amp; Avionics C4ISR Division</NGCENTOrganization>
+    <NGCENTWorkProduct xmlns="ba5c2ff5-18fb-4711-8831-7a91b9c32f36" xsi:nil="true"/>
+    <NGCENTProgram xmlns="ba5c2ff5-18fb-4711-8831-7a91b9c32f36" xsi:nil="true"/>
+    <NGCENTAuthorString xmlns="ba5c2ff5-18fb-4711-8831-7a91b9c32f36" xsi:nil="true"/>
+    <Customer xmlns="ba5c2ff5-18fb-4711-8831-7a91b9c32f36" xsi:nil="true"/>
+    <Operating_x0020_Unit xmlns="ba5c2ff5-18fb-4711-8831-7a91b9c32f36" xsi:nil="true"/>
+    <NGCENTItemType xmlns="ba5c2ff5-18fb-4711-8831-7a91b9c32f36" xsi:nil="true"/>
+    <NGCENTDivision xmlns="ba5c2ff5-18fb-4711-8831-7a91b9c32f36" xsi:nil="true"/>
+    <NGCENTOriginalSourceId xmlns="ba5c2ff5-18fb-4711-8831-7a91b9c32f36" xsi:nil="true"/>
+    <NGCENTProductLines xmlns="ba5c2ff5-18fb-4711-8831-7a91b9c32f36"/>
+    <kd979d3d42bb49bd8c59d13000e6e225 xmlns="ba5c2ff5-18fb-4711-8831-7a91b9c32f36">
+      <Terms xmlns="http://schemas.microsoft.com/office/infopath/2007/PartnerControls">
+        <TermInfo xmlns="http://schemas.microsoft.com/office/infopath/2007/PartnerControls">
+          <TermName xmlns="http://schemas.microsoft.com/office/infopath/2007/PartnerControls">Mission Systems (MS)</TermName>
+          <TermId xmlns="http://schemas.microsoft.com/office/infopath/2007/PartnerControls">d68bdba8-7e6a-40ac-9c78-5bd95e88fcf8</TermId>
+        </TermInfo>
+      </Terms>
+    </kd979d3d42bb49bd8c59d13000e6e225>
+    <TaxCatchAll xmlns="ba5c2ff5-18fb-4711-8831-7a91b9c32f36">
+      <Value>2</Value>
+      <Value>1</Value>
+    </TaxCatchAll>
+  </documentManagement>
+</p:properties>
+</file>
+
+<file path=customXml/item3.xml><?xml version="1.0" encoding="utf-8"?>
+<?mso-contentType ?>
+<FormTemplates xmlns="http://schemas.microsoft.com/sharepoint/v3/contenttype/forms">
+  <Display>DocumentLibraryForm</Display>
+  <Edit>DocumentLibraryForm</Edit>
+  <New>DocumentLibraryForm</New>
+</FormTemplates>
+</file>
+
 <file path=customXml/item4.xml><?xml version="1.0" encoding="utf-8"?>
 <?mso-contentType ?>
 <spe:Receivers xmlns:spe="http://schemas.microsoft.com/sharepoint/events">
@@ -7727,30 +8886,6 @@
 </file>
 
 <file path=customXml/itemProps1.xml><?xml version="1.0" encoding="utf-8"?>
-<ds:datastoreItem xmlns:ds="http://schemas.openxmlformats.org/officeDocument/2006/customXml" ds:itemID="{7E0C8B0C-825D-4C3C-9D40-BEB7FCB8D92A}">
-  <ds:schemaRefs>
-    <ds:schemaRef ds:uri="http://schemas.microsoft.com/sharepoint/v3/contenttype/forms"/>
-  </ds:schemaRefs>
-</ds:datastoreItem>
-</file>
-
-<file path=customXml/itemProps2.xml><?xml version="1.0" encoding="utf-8"?>
-<ds:datastoreItem xmlns:ds="http://schemas.openxmlformats.org/officeDocument/2006/customXml" ds:itemID="{2356F173-A83A-4A68-A5F0-7AEE95753FDB}">
-  <ds:schemaRefs>
-    <ds:schemaRef ds:uri="ba5c2ff5-18fb-4711-8831-7a91b9c32f36"/>
-    <ds:schemaRef ds:uri="http://schemas.microsoft.com/office/infopath/2007/PartnerControls"/>
-    <ds:schemaRef ds:uri="http://www.w3.org/XML/1998/namespace"/>
-    <ds:schemaRef ds:uri="http://purl.org/dc/elements/1.1/"/>
-    <ds:schemaRef ds:uri="http://schemas.openxmlformats.org/package/2006/metadata/core-properties"/>
-    <ds:schemaRef ds:uri="http://purl.org/dc/terms/"/>
-    <ds:schemaRef ds:uri="http://schemas.microsoft.com/office/2006/metadata/properties"/>
-    <ds:schemaRef ds:uri="http://schemas.microsoft.com/office/2006/documentManagement/types"/>
-    <ds:schemaRef ds:uri="http://purl.org/dc/dcmitype/"/>
-  </ds:schemaRefs>
-</ds:datastoreItem>
-</file>
-
-<file path=customXml/itemProps3.xml><?xml version="1.0" encoding="utf-8"?>
 <ds:datastoreItem xmlns:ds="http://schemas.openxmlformats.org/officeDocument/2006/customXml" ds:itemID="{81F24940-C2B5-4FCE-9FEC-7BE3E787DBFA}">
   <ds:schemaRefs>
     <ds:schemaRef ds:uri="http://schemas.microsoft.com/office/2006/metadata/contentType"/>
@@ -7768,6 +8903,30 @@
 </ds:datastoreItem>
 </file>
 
+<file path=customXml/itemProps2.xml><?xml version="1.0" encoding="utf-8"?>
+<ds:datastoreItem xmlns:ds="http://schemas.openxmlformats.org/officeDocument/2006/customXml" ds:itemID="{2356F173-A83A-4A68-A5F0-7AEE95753FDB}">
+  <ds:schemaRefs>
+    <ds:schemaRef ds:uri="http://purl.org/dc/dcmitype/"/>
+    <ds:schemaRef ds:uri="ba5c2ff5-18fb-4711-8831-7a91b9c32f36"/>
+    <ds:schemaRef ds:uri="http://schemas.microsoft.com/office/2006/documentManagement/types"/>
+    <ds:schemaRef ds:uri="http://www.w3.org/XML/1998/namespace"/>
+    <ds:schemaRef ds:uri="http://schemas.microsoft.com/office/infopath/2007/PartnerControls"/>
+    <ds:schemaRef ds:uri="http://purl.org/dc/terms/"/>
+    <ds:schemaRef ds:uri="http://schemas.openxmlformats.org/package/2006/metadata/core-properties"/>
+    <ds:schemaRef ds:uri="http://schemas.microsoft.com/office/2006/metadata/properties"/>
+    <ds:schemaRef ds:uri="http://purl.org/dc/elements/1.1/"/>
+  </ds:schemaRefs>
+</ds:datastoreItem>
+</file>
+
+<file path=customXml/itemProps3.xml><?xml version="1.0" encoding="utf-8"?>
+<ds:datastoreItem xmlns:ds="http://schemas.openxmlformats.org/officeDocument/2006/customXml" ds:itemID="{7E0C8B0C-825D-4C3C-9D40-BEB7FCB8D92A}">
+  <ds:schemaRefs>
+    <ds:schemaRef ds:uri="http://schemas.microsoft.com/sharepoint/v3/contenttype/forms"/>
+  </ds:schemaRefs>
+</ds:datastoreItem>
+</file>
+
 <file path=customXml/itemProps4.xml><?xml version="1.0" encoding="utf-8"?>
 <ds:datastoreItem xmlns:ds="http://schemas.openxmlformats.org/officeDocument/2006/customXml" ds:itemID="{A11FB5A1-796E-4C2D-BE39-808EAADC665E}">
   <ds:schemaRefs>

</xml_diff>

<commit_message>
updated presentation with spelling corrections
</commit_message>
<xml_diff>
--- a/GRTC Project.pptx
+++ b/GRTC Project.pptx
@@ -5247,15 +5247,7 @@
           <a:p>
             <a:r>
               <a:rPr lang="en-US" sz="1800" kern="0" dirty="0"/>
-              <a:t>Python </a:t>
-            </a:r>
-            <a:r>
-              <a:rPr lang="en-US" sz="1800" kern="0" dirty="0" err="1"/>
-              <a:t>Scikit</a:t>
-            </a:r>
-            <a:r>
-              <a:rPr lang="en-US" sz="1800" kern="0" dirty="0"/>
-              <a:t>-Learn</a:t>
+              <a:t>Python Scikit-Learn</a:t>
             </a:r>
           </a:p>
           <a:p>
@@ -5789,15 +5781,7 @@
             <a:pPr lvl="1"/>
             <a:r>
               <a:rPr lang="en-US" sz="1500" kern="0" dirty="0"/>
-              <a:t>Week Type (weekday, </a:t>
-            </a:r>
-            <a:r>
-              <a:rPr lang="en-US" sz="1500" kern="0" dirty="0" err="1"/>
-              <a:t>Saurday</a:t>
-            </a:r>
-            <a:r>
-              <a:rPr lang="en-US" sz="1500" kern="0" dirty="0"/>
-              <a:t>, or Sunday)</a:t>
+              <a:t>Week Type (weekday, Saturday, or Sunday)</a:t>
             </a:r>
           </a:p>
           <a:p>
@@ -8906,15 +8890,15 @@
 <file path=customXml/itemProps2.xml><?xml version="1.0" encoding="utf-8"?>
 <ds:datastoreItem xmlns:ds="http://schemas.openxmlformats.org/officeDocument/2006/customXml" ds:itemID="{2356F173-A83A-4A68-A5F0-7AEE95753FDB}">
   <ds:schemaRefs>
-    <ds:schemaRef ds:uri="http://purl.org/dc/dcmitype/"/>
-    <ds:schemaRef ds:uri="ba5c2ff5-18fb-4711-8831-7a91b9c32f36"/>
+    <ds:schemaRef ds:uri="http://schemas.openxmlformats.org/package/2006/metadata/core-properties"/>
+    <ds:schemaRef ds:uri="http://purl.org/dc/elements/1.1/"/>
     <ds:schemaRef ds:uri="http://schemas.microsoft.com/office/2006/documentManagement/types"/>
     <ds:schemaRef ds:uri="http://www.w3.org/XML/1998/namespace"/>
+    <ds:schemaRef ds:uri="http://schemas.microsoft.com/office/2006/metadata/properties"/>
+    <ds:schemaRef ds:uri="ba5c2ff5-18fb-4711-8831-7a91b9c32f36"/>
+    <ds:schemaRef ds:uri="http://purl.org/dc/dcmitype/"/>
     <ds:schemaRef ds:uri="http://schemas.microsoft.com/office/infopath/2007/PartnerControls"/>
     <ds:schemaRef ds:uri="http://purl.org/dc/terms/"/>
-    <ds:schemaRef ds:uri="http://schemas.openxmlformats.org/package/2006/metadata/core-properties"/>
-    <ds:schemaRef ds:uri="http://schemas.microsoft.com/office/2006/metadata/properties"/>
-    <ds:schemaRef ds:uri="http://purl.org/dc/elements/1.1/"/>
   </ds:schemaRefs>
 </ds:datastoreItem>
 </file>

</xml_diff>

<commit_message>
updated presentation for WED
</commit_message>
<xml_diff>
--- a/GRTC Project.pptx
+++ b/GRTC Project.pptx
@@ -6337,7 +6337,7 @@
           <a:p>
             <a:r>
               <a:rPr lang="en-US" sz="1800" kern="0" dirty="0"/>
-              <a:t>Created four models:</a:t>
+              <a:t>Created four classification models:</a:t>
             </a:r>
           </a:p>
           <a:p>
@@ -6809,17 +6809,14 @@
           <a:p>
             <a:r>
               <a:rPr lang="en-US" sz="1800" kern="0" dirty="0"/>
-              <a:t>A visual examination of these factors using Tableau show a difference in performance metrics for stops associated with a Local vs. an Express Route</a:t>
+              <a:t>A visual examination of these factors using Tableau show a difference in performance metrics for stops associated with a Local vs. an Express Route (on-time performance vs. efficiency) </a:t>
             </a:r>
           </a:p>
           <a:p>
             <a:r>
               <a:rPr lang="en-US" sz="1800" kern="0" dirty="0"/>
-              <a:t>GRTC might benefit from a review of their current performance metrics to better account for the differences in objects and performance (as identified in this project) between Local and Express routes (and their stops) </a:t>
-            </a:r>
-          </a:p>
-          <a:p>
-            <a:endParaRPr lang="en-US" sz="1800" kern="0" dirty="0"/>
+              <a:t>GRTC might benefit from a review of their current performance metrics to better account for the differences in objects and performance (as identified in this project) between Local and Express routes and adopt performance metrics for each (vs. a “one size fits all” performance metric approach </a:t>
+            </a:r>
           </a:p>
         </p:txBody>
       </p:sp>
@@ -8244,6 +8241,67 @@
 </file>
 
 <file path=customXml/item1.xml><?xml version="1.0" encoding="utf-8"?>
+<p:properties xmlns:p="http://schemas.microsoft.com/office/2006/metadata/properties" xmlns:xsi="http://www.w3.org/2001/XMLSchema-instance" xmlns:pc="http://schemas.microsoft.com/office/infopath/2007/PartnerControls">
+  <documentManagement>
+    <NGCENTMigratedNotes xmlns="ba5c2ff5-18fb-4711-8831-7a91b9c32f36" xsi:nil="true"/>
+    <e15ccd119fb74fd7baadd5fc37145f51 xmlns="ba5c2ff5-18fb-4711-8831-7a91b9c32f36">
+      <Terms xmlns="http://schemas.microsoft.com/office/infopath/2007/PartnerControls"/>
+    </e15ccd119fb74fd7baadd5fc37145f51>
+    <NGCENTOwnerString xmlns="ba5c2ff5-18fb-4711-8831-7a91b9c32f36" xsi:nil="true"/>
+    <NGCENTDescription xmlns="ba5c2ff5-18fb-4711-8831-7a91b9c32f36" xsi:nil="true"/>
+    <NGCENTOriginalLocation xmlns="ba5c2ff5-18fb-4711-8831-7a91b9c32f36" xsi:nil="true"/>
+    <Business_x0020_Unit xmlns="ba5c2ff5-18fb-4711-8831-7a91b9c32f36" xsi:nil="true"/>
+    <NGCENTTeam xmlns="ba5c2ff5-18fb-4711-8831-7a91b9c32f36" xsi:nil="true"/>
+    <NGCENTMigratedOriginalFilename xmlns="ba5c2ff5-18fb-4711-8831-7a91b9c32f36" xsi:nil="true"/>
+    <NGCENTDocumentAuthor xmlns="ba5c2ff5-18fb-4711-8831-7a91b9c32f36">
+      <UserInfo>
+        <DisplayName/>
+        <AccountId xsi:nil="true"/>
+        <AccountType/>
+      </UserInfo>
+    </NGCENTDocumentAuthor>
+    <db1f98847b414a48afdff26e6d25506c xmlns="ba5c2ff5-18fb-4711-8831-7a91b9c32f36">
+      <Terms xmlns="http://schemas.microsoft.com/office/infopath/2007/PartnerControls">
+        <TermInfo xmlns="http://schemas.microsoft.com/office/infopath/2007/PartnerControls">
+          <TermName xmlns="http://schemas.microsoft.com/office/infopath/2007/PartnerControls">United States (US)</TermName>
+          <TermId xmlns="http://schemas.microsoft.com/office/infopath/2007/PartnerControls">f4f4ed40-0317-491b-9959-5ea628d96313</TermId>
+        </TermInfo>
+      </Terms>
+    </db1f98847b414a48afdff26e6d25506c>
+    <NGCENTDocumentOwner xmlns="ba5c2ff5-18fb-4711-8831-7a91b9c32f36">
+      <UserInfo>
+        <DisplayName/>
+        <AccountId xsi:nil="true"/>
+        <AccountType/>
+      </UserInfo>
+    </NGCENTDocumentOwner>
+    <NGCENTOrganization xmlns="ba5c2ff5-18fb-4711-8831-7a91b9c32f36">Land &amp; Avionics C4ISR Division</NGCENTOrganization>
+    <NGCENTWorkProduct xmlns="ba5c2ff5-18fb-4711-8831-7a91b9c32f36" xsi:nil="true"/>
+    <NGCENTProgram xmlns="ba5c2ff5-18fb-4711-8831-7a91b9c32f36" xsi:nil="true"/>
+    <NGCENTAuthorString xmlns="ba5c2ff5-18fb-4711-8831-7a91b9c32f36" xsi:nil="true"/>
+    <Customer xmlns="ba5c2ff5-18fb-4711-8831-7a91b9c32f36" xsi:nil="true"/>
+    <Operating_x0020_Unit xmlns="ba5c2ff5-18fb-4711-8831-7a91b9c32f36" xsi:nil="true"/>
+    <NGCENTItemType xmlns="ba5c2ff5-18fb-4711-8831-7a91b9c32f36" xsi:nil="true"/>
+    <NGCENTDivision xmlns="ba5c2ff5-18fb-4711-8831-7a91b9c32f36" xsi:nil="true"/>
+    <NGCENTOriginalSourceId xmlns="ba5c2ff5-18fb-4711-8831-7a91b9c32f36" xsi:nil="true"/>
+    <NGCENTProductLines xmlns="ba5c2ff5-18fb-4711-8831-7a91b9c32f36"/>
+    <kd979d3d42bb49bd8c59d13000e6e225 xmlns="ba5c2ff5-18fb-4711-8831-7a91b9c32f36">
+      <Terms xmlns="http://schemas.microsoft.com/office/infopath/2007/PartnerControls">
+        <TermInfo xmlns="http://schemas.microsoft.com/office/infopath/2007/PartnerControls">
+          <TermName xmlns="http://schemas.microsoft.com/office/infopath/2007/PartnerControls">Mission Systems (MS)</TermName>
+          <TermId xmlns="http://schemas.microsoft.com/office/infopath/2007/PartnerControls">d68bdba8-7e6a-40ac-9c78-5bd95e88fcf8</TermId>
+        </TermInfo>
+      </Terms>
+    </kd979d3d42bb49bd8c59d13000e6e225>
+    <TaxCatchAll xmlns="ba5c2ff5-18fb-4711-8831-7a91b9c32f36">
+      <Value>2</Value>
+      <Value>1</Value>
+    </TaxCatchAll>
+  </documentManagement>
+</p:properties>
+</file>
+
+<file path=customXml/item2.xml><?xml version="1.0" encoding="utf-8"?>
 <ct:contentTypeSchema xmlns:ct="http://schemas.microsoft.com/office/2006/metadata/contentType" xmlns:ma="http://schemas.microsoft.com/office/2006/metadata/properties/metaAttributes" ct:_="" ma:_="" ma:contentTypeName="_Document" ma:contentTypeID="0x0101002F5E26F338044317906CD20503C3F6300003EC7B059CD2424EA831CF285ABA111C" ma:contentTypeVersion="6" ma:contentTypeDescription="Base NGC document content type containing core fields that should be available on ALL documents in the site collection" ma:contentTypeScope="" ma:versionID="0b1c68ad84a16ed8ea335fef03a640a5">
   <xsd:schema xmlns:xsd="http://www.w3.org/2001/XMLSchema" xmlns:xs="http://www.w3.org/2001/XMLSchema" xmlns:p="http://schemas.microsoft.com/office/2006/metadata/properties" xmlns:ns2="ba5c2ff5-18fb-4711-8831-7a91b9c32f36" targetNamespace="http://schemas.microsoft.com/office/2006/metadata/properties" ma:root="true" ma:fieldsID="43a389a6b506b9eaa300f559fb6bdbd1" ns2:_="">
     <xsd:import namespace="ba5c2ff5-18fb-4711-8831-7a91b9c32f36"/>
@@ -8749,77 +8807,7 @@
 </ct:contentTypeSchema>
 </file>
 
-<file path=customXml/item2.xml><?xml version="1.0" encoding="utf-8"?>
-<p:properties xmlns:p="http://schemas.microsoft.com/office/2006/metadata/properties" xmlns:xsi="http://www.w3.org/2001/XMLSchema-instance" xmlns:pc="http://schemas.microsoft.com/office/infopath/2007/PartnerControls">
-  <documentManagement>
-    <NGCENTMigratedNotes xmlns="ba5c2ff5-18fb-4711-8831-7a91b9c32f36" xsi:nil="true"/>
-    <e15ccd119fb74fd7baadd5fc37145f51 xmlns="ba5c2ff5-18fb-4711-8831-7a91b9c32f36">
-      <Terms xmlns="http://schemas.microsoft.com/office/infopath/2007/PartnerControls"/>
-    </e15ccd119fb74fd7baadd5fc37145f51>
-    <NGCENTOwnerString xmlns="ba5c2ff5-18fb-4711-8831-7a91b9c32f36" xsi:nil="true"/>
-    <NGCENTDescription xmlns="ba5c2ff5-18fb-4711-8831-7a91b9c32f36" xsi:nil="true"/>
-    <NGCENTOriginalLocation xmlns="ba5c2ff5-18fb-4711-8831-7a91b9c32f36" xsi:nil="true"/>
-    <Business_x0020_Unit xmlns="ba5c2ff5-18fb-4711-8831-7a91b9c32f36" xsi:nil="true"/>
-    <NGCENTTeam xmlns="ba5c2ff5-18fb-4711-8831-7a91b9c32f36" xsi:nil="true"/>
-    <NGCENTMigratedOriginalFilename xmlns="ba5c2ff5-18fb-4711-8831-7a91b9c32f36" xsi:nil="true"/>
-    <NGCENTDocumentAuthor xmlns="ba5c2ff5-18fb-4711-8831-7a91b9c32f36">
-      <UserInfo>
-        <DisplayName/>
-        <AccountId xsi:nil="true"/>
-        <AccountType/>
-      </UserInfo>
-    </NGCENTDocumentAuthor>
-    <db1f98847b414a48afdff26e6d25506c xmlns="ba5c2ff5-18fb-4711-8831-7a91b9c32f36">
-      <Terms xmlns="http://schemas.microsoft.com/office/infopath/2007/PartnerControls">
-        <TermInfo xmlns="http://schemas.microsoft.com/office/infopath/2007/PartnerControls">
-          <TermName xmlns="http://schemas.microsoft.com/office/infopath/2007/PartnerControls">United States (US)</TermName>
-          <TermId xmlns="http://schemas.microsoft.com/office/infopath/2007/PartnerControls">f4f4ed40-0317-491b-9959-5ea628d96313</TermId>
-        </TermInfo>
-      </Terms>
-    </db1f98847b414a48afdff26e6d25506c>
-    <NGCENTDocumentOwner xmlns="ba5c2ff5-18fb-4711-8831-7a91b9c32f36">
-      <UserInfo>
-        <DisplayName/>
-        <AccountId xsi:nil="true"/>
-        <AccountType/>
-      </UserInfo>
-    </NGCENTDocumentOwner>
-    <NGCENTOrganization xmlns="ba5c2ff5-18fb-4711-8831-7a91b9c32f36">Land &amp; Avionics C4ISR Division</NGCENTOrganization>
-    <NGCENTWorkProduct xmlns="ba5c2ff5-18fb-4711-8831-7a91b9c32f36" xsi:nil="true"/>
-    <NGCENTProgram xmlns="ba5c2ff5-18fb-4711-8831-7a91b9c32f36" xsi:nil="true"/>
-    <NGCENTAuthorString xmlns="ba5c2ff5-18fb-4711-8831-7a91b9c32f36" xsi:nil="true"/>
-    <Customer xmlns="ba5c2ff5-18fb-4711-8831-7a91b9c32f36" xsi:nil="true"/>
-    <Operating_x0020_Unit xmlns="ba5c2ff5-18fb-4711-8831-7a91b9c32f36" xsi:nil="true"/>
-    <NGCENTItemType xmlns="ba5c2ff5-18fb-4711-8831-7a91b9c32f36" xsi:nil="true"/>
-    <NGCENTDivision xmlns="ba5c2ff5-18fb-4711-8831-7a91b9c32f36" xsi:nil="true"/>
-    <NGCENTOriginalSourceId xmlns="ba5c2ff5-18fb-4711-8831-7a91b9c32f36" xsi:nil="true"/>
-    <NGCENTProductLines xmlns="ba5c2ff5-18fb-4711-8831-7a91b9c32f36"/>
-    <kd979d3d42bb49bd8c59d13000e6e225 xmlns="ba5c2ff5-18fb-4711-8831-7a91b9c32f36">
-      <Terms xmlns="http://schemas.microsoft.com/office/infopath/2007/PartnerControls">
-        <TermInfo xmlns="http://schemas.microsoft.com/office/infopath/2007/PartnerControls">
-          <TermName xmlns="http://schemas.microsoft.com/office/infopath/2007/PartnerControls">Mission Systems (MS)</TermName>
-          <TermId xmlns="http://schemas.microsoft.com/office/infopath/2007/PartnerControls">d68bdba8-7e6a-40ac-9c78-5bd95e88fcf8</TermId>
-        </TermInfo>
-      </Terms>
-    </kd979d3d42bb49bd8c59d13000e6e225>
-    <TaxCatchAll xmlns="ba5c2ff5-18fb-4711-8831-7a91b9c32f36">
-      <Value>2</Value>
-      <Value>1</Value>
-    </TaxCatchAll>
-  </documentManagement>
-</p:properties>
-</file>
-
 <file path=customXml/item3.xml><?xml version="1.0" encoding="utf-8"?>
-<?mso-contentType ?>
-<FormTemplates xmlns="http://schemas.microsoft.com/sharepoint/v3/contenttype/forms">
-  <Display>DocumentLibraryForm</Display>
-  <Edit>DocumentLibraryForm</Edit>
-  <New>DocumentLibraryForm</New>
-</FormTemplates>
-</file>
-
-<file path=customXml/item4.xml><?xml version="1.0" encoding="utf-8"?>
 <?mso-contentType ?>
 <spe:Receivers xmlns:spe="http://schemas.microsoft.com/sharepoint/events">
   <Receiver>
@@ -8869,7 +8857,32 @@
 </spe:Receivers>
 </file>
 
+<file path=customXml/item4.xml><?xml version="1.0" encoding="utf-8"?>
+<?mso-contentType ?>
+<FormTemplates xmlns="http://schemas.microsoft.com/sharepoint/v3/contenttype/forms">
+  <Display>DocumentLibraryForm</Display>
+  <Edit>DocumentLibraryForm</Edit>
+  <New>DocumentLibraryForm</New>
+</FormTemplates>
+</file>
+
 <file path=customXml/itemProps1.xml><?xml version="1.0" encoding="utf-8"?>
+<ds:datastoreItem xmlns:ds="http://schemas.openxmlformats.org/officeDocument/2006/customXml" ds:itemID="{2356F173-A83A-4A68-A5F0-7AEE95753FDB}">
+  <ds:schemaRefs>
+    <ds:schemaRef ds:uri="http://purl.org/dc/dcmitype/"/>
+    <ds:schemaRef ds:uri="http://schemas.microsoft.com/office/2006/metadata/properties"/>
+    <ds:schemaRef ds:uri="http://www.w3.org/XML/1998/namespace"/>
+    <ds:schemaRef ds:uri="http://schemas.openxmlformats.org/package/2006/metadata/core-properties"/>
+    <ds:schemaRef ds:uri="http://purl.org/dc/elements/1.1/"/>
+    <ds:schemaRef ds:uri="http://schemas.microsoft.com/office/2006/documentManagement/types"/>
+    <ds:schemaRef ds:uri="http://purl.org/dc/terms/"/>
+    <ds:schemaRef ds:uri="ba5c2ff5-18fb-4711-8831-7a91b9c32f36"/>
+    <ds:schemaRef ds:uri="http://schemas.microsoft.com/office/infopath/2007/PartnerControls"/>
+  </ds:schemaRefs>
+</ds:datastoreItem>
+</file>
+
+<file path=customXml/itemProps2.xml><?xml version="1.0" encoding="utf-8"?>
 <ds:datastoreItem xmlns:ds="http://schemas.openxmlformats.org/officeDocument/2006/customXml" ds:itemID="{81F24940-C2B5-4FCE-9FEC-7BE3E787DBFA}">
   <ds:schemaRefs>
     <ds:schemaRef ds:uri="http://schemas.microsoft.com/office/2006/metadata/contentType"/>
@@ -8887,34 +8900,18 @@
 </ds:datastoreItem>
 </file>
 
-<file path=customXml/itemProps2.xml><?xml version="1.0" encoding="utf-8"?>
-<ds:datastoreItem xmlns:ds="http://schemas.openxmlformats.org/officeDocument/2006/customXml" ds:itemID="{2356F173-A83A-4A68-A5F0-7AEE95753FDB}">
+<file path=customXml/itemProps3.xml><?xml version="1.0" encoding="utf-8"?>
+<ds:datastoreItem xmlns:ds="http://schemas.openxmlformats.org/officeDocument/2006/customXml" ds:itemID="{A11FB5A1-796E-4C2D-BE39-808EAADC665E}">
   <ds:schemaRefs>
-    <ds:schemaRef ds:uri="http://schemas.openxmlformats.org/package/2006/metadata/core-properties"/>
-    <ds:schemaRef ds:uri="http://purl.org/dc/elements/1.1/"/>
-    <ds:schemaRef ds:uri="http://schemas.microsoft.com/office/2006/documentManagement/types"/>
-    <ds:schemaRef ds:uri="http://www.w3.org/XML/1998/namespace"/>
-    <ds:schemaRef ds:uri="http://schemas.microsoft.com/office/2006/metadata/properties"/>
-    <ds:schemaRef ds:uri="ba5c2ff5-18fb-4711-8831-7a91b9c32f36"/>
-    <ds:schemaRef ds:uri="http://purl.org/dc/dcmitype/"/>
-    <ds:schemaRef ds:uri="http://schemas.microsoft.com/office/infopath/2007/PartnerControls"/>
-    <ds:schemaRef ds:uri="http://purl.org/dc/terms/"/>
+    <ds:schemaRef ds:uri="http://schemas.microsoft.com/sharepoint/events"/>
   </ds:schemaRefs>
 </ds:datastoreItem>
 </file>
 
-<file path=customXml/itemProps3.xml><?xml version="1.0" encoding="utf-8"?>
+<file path=customXml/itemProps4.xml><?xml version="1.0" encoding="utf-8"?>
 <ds:datastoreItem xmlns:ds="http://schemas.openxmlformats.org/officeDocument/2006/customXml" ds:itemID="{7E0C8B0C-825D-4C3C-9D40-BEB7FCB8D92A}">
   <ds:schemaRefs>
     <ds:schemaRef ds:uri="http://schemas.microsoft.com/sharepoint/v3/contenttype/forms"/>
   </ds:schemaRefs>
 </ds:datastoreItem>
-</file>
-
-<file path=customXml/itemProps4.xml><?xml version="1.0" encoding="utf-8"?>
-<ds:datastoreItem xmlns:ds="http://schemas.openxmlformats.org/officeDocument/2006/customXml" ds:itemID="{A11FB5A1-796E-4C2D-BE39-808EAADC665E}">
-  <ds:schemaRefs>
-    <ds:schemaRef ds:uri="http://schemas.microsoft.com/sharepoint/events"/>
-  </ds:schemaRefs>
-</ds:datastoreItem>
 </file>
</xml_diff>